<commit_message>
ignore data dir, remove 2 imgs, add EGS poster/CV files
</commit_message>
<xml_diff>
--- a/poster2/KERSULIS_JONAS_Poster.pptx
+++ b/poster2/KERSULIS_JONAS_Poster.pptx
@@ -314,7 +314,7 @@
           <a:p>
             <a:fld id="{8AA6B33A-68B2-4DB8-A006-B6F90452E625}" type="datetimeFigureOut">
               <a:rPr lang="en-US" smtClean="0"/>
-              <a:t>10/6/2015</a:t>
+              <a:t>10/7/2015</a:t>
             </a:fld>
             <a:endParaRPr lang="en-US"/>
           </a:p>
@@ -484,7 +484,7 @@
           <a:p>
             <a:fld id="{8AA6B33A-68B2-4DB8-A006-B6F90452E625}" type="datetimeFigureOut">
               <a:rPr lang="en-US" smtClean="0"/>
-              <a:t>10/6/2015</a:t>
+              <a:t>10/7/2015</a:t>
             </a:fld>
             <a:endParaRPr lang="en-US"/>
           </a:p>
@@ -664,7 +664,7 @@
           <a:p>
             <a:fld id="{8AA6B33A-68B2-4DB8-A006-B6F90452E625}" type="datetimeFigureOut">
               <a:rPr lang="en-US" smtClean="0"/>
-              <a:t>10/6/2015</a:t>
+              <a:t>10/7/2015</a:t>
             </a:fld>
             <a:endParaRPr lang="en-US"/>
           </a:p>
@@ -834,7 +834,7 @@
           <a:p>
             <a:fld id="{8AA6B33A-68B2-4DB8-A006-B6F90452E625}" type="datetimeFigureOut">
               <a:rPr lang="en-US" smtClean="0"/>
-              <a:t>10/6/2015</a:t>
+              <a:t>10/7/2015</a:t>
             </a:fld>
             <a:endParaRPr lang="en-US"/>
           </a:p>
@@ -1078,7 +1078,7 @@
           <a:p>
             <a:fld id="{8AA6B33A-68B2-4DB8-A006-B6F90452E625}" type="datetimeFigureOut">
               <a:rPr lang="en-US" smtClean="0"/>
-              <a:t>10/6/2015</a:t>
+              <a:t>10/7/2015</a:t>
             </a:fld>
             <a:endParaRPr lang="en-US"/>
           </a:p>
@@ -1310,7 +1310,7 @@
           <a:p>
             <a:fld id="{8AA6B33A-68B2-4DB8-A006-B6F90452E625}" type="datetimeFigureOut">
               <a:rPr lang="en-US" smtClean="0"/>
-              <a:t>10/6/2015</a:t>
+              <a:t>10/7/2015</a:t>
             </a:fld>
             <a:endParaRPr lang="en-US"/>
           </a:p>
@@ -1677,7 +1677,7 @@
           <a:p>
             <a:fld id="{8AA6B33A-68B2-4DB8-A006-B6F90452E625}" type="datetimeFigureOut">
               <a:rPr lang="en-US" smtClean="0"/>
-              <a:t>10/6/2015</a:t>
+              <a:t>10/7/2015</a:t>
             </a:fld>
             <a:endParaRPr lang="en-US"/>
           </a:p>
@@ -1795,7 +1795,7 @@
           <a:p>
             <a:fld id="{8AA6B33A-68B2-4DB8-A006-B6F90452E625}" type="datetimeFigureOut">
               <a:rPr lang="en-US" smtClean="0"/>
-              <a:t>10/6/2015</a:t>
+              <a:t>10/7/2015</a:t>
             </a:fld>
             <a:endParaRPr lang="en-US"/>
           </a:p>
@@ -1890,7 +1890,7 @@
           <a:p>
             <a:fld id="{8AA6B33A-68B2-4DB8-A006-B6F90452E625}" type="datetimeFigureOut">
               <a:rPr lang="en-US" smtClean="0"/>
-              <a:t>10/6/2015</a:t>
+              <a:t>10/7/2015</a:t>
             </a:fld>
             <a:endParaRPr lang="en-US"/>
           </a:p>
@@ -2167,7 +2167,7 @@
           <a:p>
             <a:fld id="{8AA6B33A-68B2-4DB8-A006-B6F90452E625}" type="datetimeFigureOut">
               <a:rPr lang="en-US" smtClean="0"/>
-              <a:t>10/6/2015</a:t>
+              <a:t>10/7/2015</a:t>
             </a:fld>
             <a:endParaRPr lang="en-US"/>
           </a:p>
@@ -2424,7 +2424,7 @@
           <a:p>
             <a:fld id="{8AA6B33A-68B2-4DB8-A006-B6F90452E625}" type="datetimeFigureOut">
               <a:rPr lang="en-US" smtClean="0"/>
-              <a:t>10/6/2015</a:t>
+              <a:t>10/7/2015</a:t>
             </a:fld>
             <a:endParaRPr lang="en-US"/>
           </a:p>
@@ -2637,7 +2637,7 @@
           <a:p>
             <a:fld id="{8AA6B33A-68B2-4DB8-A006-B6F90452E625}" type="datetimeFigureOut">
               <a:rPr lang="en-US" smtClean="0"/>
-              <a:t>10/6/2015</a:t>
+              <a:t>10/7/2015</a:t>
             </a:fld>
             <a:endParaRPr lang="en-US"/>
           </a:p>
@@ -3050,46 +3050,9 @@
           <a:chExt cx="0" cy="0"/>
         </a:xfrm>
       </p:grpSpPr>
-      <p:sp>
-        <p:nvSpPr>
-          <p:cNvPr id="78" name="TextBox 77"/>
-          <p:cNvSpPr txBox="1"/>
-          <p:nvPr/>
-        </p:nvSpPr>
-        <p:spPr>
-          <a:xfrm>
-            <a:off x="14401799" y="32906203"/>
-            <a:ext cx="9194801" cy="830997"/>
-          </a:xfrm>
-          <a:prstGeom prst="rect">
-            <a:avLst/>
-          </a:prstGeom>
-          <a:solidFill>
-            <a:srgbClr val="03204F"/>
-          </a:solidFill>
-        </p:spPr>
-        <p:txBody>
-          <a:bodyPr wrap="square" rtlCol="0" anchor="ctr">
-            <a:spAutoFit/>
-          </a:bodyPr>
-          <a:lstStyle/>
-          <a:p>
-            <a:r>
-              <a:rPr lang="en-US" sz="4800" b="1" dirty="0">
-                <a:solidFill>
-                  <a:srgbClr val="F8C728"/>
-                </a:solidFill>
-                <a:latin typeface="Arial"/>
-                <a:cs typeface="Arial"/>
-              </a:rPr>
-              <a:t>References</a:t>
-            </a:r>
-          </a:p>
-        </p:txBody>
-      </p:sp>
       <p:pic>
         <p:nvPicPr>
-          <p:cNvPr id="79" name="Picture 78"/>
+          <p:cNvPr id="4" name="Picture 3"/>
           <p:cNvPicPr>
             <a:picLocks noChangeAspect="1"/>
           </p:cNvPicPr>
@@ -3109,8 +3072,75 @@
         </p:blipFill>
         <p:spPr>
           <a:xfrm>
-            <a:off x="6477000" y="29756641"/>
-            <a:ext cx="7315201" cy="5486400"/>
+            <a:off x="20526441" y="19395294"/>
+            <a:ext cx="6657908" cy="4993431"/>
+          </a:xfrm>
+          <a:prstGeom prst="rect">
+            <a:avLst/>
+          </a:prstGeom>
+        </p:spPr>
+      </p:pic>
+      <p:sp>
+        <p:nvSpPr>
+          <p:cNvPr id="78" name="TextBox 77"/>
+          <p:cNvSpPr txBox="1"/>
+          <p:nvPr/>
+        </p:nvSpPr>
+        <p:spPr>
+          <a:xfrm>
+            <a:off x="14401799" y="32652203"/>
+            <a:ext cx="9194801" cy="830997"/>
+          </a:xfrm>
+          <a:prstGeom prst="rect">
+            <a:avLst/>
+          </a:prstGeom>
+          <a:solidFill>
+            <a:srgbClr val="03204F"/>
+          </a:solidFill>
+        </p:spPr>
+        <p:txBody>
+          <a:bodyPr wrap="square" rtlCol="0" anchor="ctr">
+            <a:spAutoFit/>
+          </a:bodyPr>
+          <a:lstStyle/>
+          <a:p>
+            <a:r>
+              <a:rPr lang="en-US" sz="4800" b="1" dirty="0">
+                <a:solidFill>
+                  <a:srgbClr val="F8C728"/>
+                </a:solidFill>
+                <a:latin typeface="Arial"/>
+                <a:cs typeface="Arial"/>
+              </a:rPr>
+              <a:t>References</a:t>
+            </a:r>
+          </a:p>
+        </p:txBody>
+      </p:sp>
+      <p:pic>
+        <p:nvPicPr>
+          <p:cNvPr id="79" name="Picture 78"/>
+          <p:cNvPicPr>
+            <a:picLocks noChangeAspect="1"/>
+          </p:cNvPicPr>
+          <p:nvPr/>
+        </p:nvPicPr>
+        <p:blipFill>
+          <a:blip r:embed="rId3" cstate="print">
+            <a:extLst>
+              <a:ext uri="{28A0092B-C50C-407E-A947-70E740481C1C}">
+                <a14:useLocalDpi xmlns:a14="http://schemas.microsoft.com/office/drawing/2010/main" val="0"/>
+              </a:ext>
+            </a:extLst>
+          </a:blip>
+          <a:stretch>
+            <a:fillRect/>
+          </a:stretch>
+        </p:blipFill>
+        <p:spPr>
+          <a:xfrm>
+            <a:off x="5524568" y="29121640"/>
+            <a:ext cx="8318434" cy="6238825"/>
           </a:xfrm>
           <a:prstGeom prst="rect">
             <a:avLst/>
@@ -3126,7 +3156,7 @@
           <p:nvPr/>
         </p:nvPicPr>
         <p:blipFill>
-          <a:blip r:embed="rId3" cstate="print">
+          <a:blip r:embed="rId4" cstate="print">
             <a:extLst>
               <a:ext uri="{28A0092B-C50C-407E-A947-70E740481C1C}">
                 <a14:useLocalDpi xmlns:a14="http://schemas.microsoft.com/office/drawing/2010/main" val="0"/>
@@ -3157,7 +3187,7 @@
             </p:nvSpPr>
             <p:spPr>
               <a:xfrm>
-                <a:off x="914400" y="13187468"/>
+                <a:off x="914400" y="12984268"/>
                 <a:ext cx="12129099" cy="15716675"/>
               </a:xfrm>
               <a:prstGeom prst="rect">
@@ -3204,7 +3234,14 @@
                     <a:latin typeface="Arial" panose="020B0604020202020204" pitchFamily="34" charset="0"/>
                     <a:cs typeface="Arial" panose="020B0604020202020204" pitchFamily="34" charset="0"/>
                   </a:rPr>
-                  <a:t>Trick 1: use DC power flow approximation with droop response.</a:t>
+                  <a:t>Maneuver 1</a:t>
+                </a:r>
+                <a:r>
+                  <a:rPr lang="en-US" sz="2800" b="1" dirty="0" smtClean="0">
+                    <a:latin typeface="Arial" panose="020B0604020202020204" pitchFamily="34" charset="0"/>
+                    <a:cs typeface="Arial" panose="020B0604020202020204" pitchFamily="34" charset="0"/>
+                  </a:rPr>
+                  <a:t>: use DC power flow approximation with droop response.</a:t>
                 </a:r>
                 <a:endParaRPr lang="en-US" sz="2800" dirty="0" smtClean="0">
                   <a:latin typeface="Arial" panose="020B0604020202020204" pitchFamily="34" charset="0"/>
@@ -3256,6 +3293,13 @@
                           <a:cs typeface="Arial" panose="020B0604020202020204" pitchFamily="34" charset="0"/>
                         </a:rPr>
                         <m:t>𝐛</m:t>
+                      </m:r>
+                      <m:r>
+                        <a:rPr lang="en-US" sz="2800" b="1" i="0" smtClean="0">
+                          <a:latin typeface="Cambria Math" panose="02040503050406030204" pitchFamily="18" charset="0"/>
+                          <a:cs typeface="Arial" panose="020B0604020202020204" pitchFamily="34" charset="0"/>
+                        </a:rPr>
+                        <m:t>,</m:t>
                       </m:r>
                     </m:oMath>
                   </m:oMathPara>
@@ -3436,7 +3480,14 @@
                     <a:latin typeface="Arial" panose="020B0604020202020204" pitchFamily="34" charset="0"/>
                     <a:cs typeface="Arial" panose="020B0604020202020204" pitchFamily="34" charset="0"/>
                   </a:rPr>
-                  <a:t>Trick 2: </a:t>
+                  <a:t>Maneuver 2</a:t>
+                </a:r>
+                <a:r>
+                  <a:rPr lang="en-US" sz="2800" b="1" dirty="0" smtClean="0">
+                    <a:latin typeface="Arial" panose="020B0604020202020204" pitchFamily="34" charset="0"/>
+                    <a:cs typeface="Arial" panose="020B0604020202020204" pitchFamily="34" charset="0"/>
+                  </a:rPr>
+                  <a:t>: </a:t>
                 </a:r>
                 <a:r>
                   <a:rPr lang="en-US" sz="2800" b="1" dirty="0">
@@ -3736,8 +3787,19 @@
                     <a:latin typeface="Arial" panose="020B0604020202020204" pitchFamily="34" charset="0"/>
                     <a:cs typeface="Arial" panose="020B0604020202020204" pitchFamily="34" charset="0"/>
                   </a:rPr>
-                  <a:t>Substitute into the line’s heat balance equation, then linearize the radiative heat rate and solve for the temperature trajectory. Now fixing the line’s temperature at a time step corresponds to enforcing the following constraint:</a:t>
+                  <a:t>Substitute into the line’s heat balance equation, then linearize the radiative heat rate and solve for the temperature trajectory. Now fixing the line’s temperature at a time step corresponds to </a:t>
                 </a:r>
+                <a:r>
+                  <a:rPr lang="en-US" sz="2800" dirty="0" smtClean="0">
+                    <a:latin typeface="Arial" panose="020B0604020202020204" pitchFamily="34" charset="0"/>
+                    <a:cs typeface="Arial" panose="020B0604020202020204" pitchFamily="34" charset="0"/>
+                  </a:rPr>
+                  <a:t>enforcing</a:t>
+                </a:r>
+                <a:endParaRPr lang="en-US" sz="2800" dirty="0" smtClean="0">
+                  <a:latin typeface="Arial" panose="020B0604020202020204" pitchFamily="34" charset="0"/>
+                  <a:cs typeface="Arial" panose="020B0604020202020204" pitchFamily="34" charset="0"/>
+                </a:endParaRPr>
               </a:p>
               <a:p>
                 <a:pPr algn="just">
@@ -3802,6 +3864,13 @@
                           <a:cs typeface="Arial" panose="020B0604020202020204" pitchFamily="34" charset="0"/>
                         </a:rPr>
                         <m:t>𝑐</m:t>
+                      </m:r>
+                      <m:r>
+                        <a:rPr lang="en-US" sz="2800" b="0" i="1" smtClean="0">
+                          <a:latin typeface="Cambria Math" panose="02040503050406030204" pitchFamily="18" charset="0"/>
+                          <a:cs typeface="Arial" panose="020B0604020202020204" pitchFamily="34" charset="0"/>
+                        </a:rPr>
+                        <m:t>,</m:t>
                       </m:r>
                     </m:oMath>
                   </m:oMathPara>
@@ -3896,7 +3965,14 @@
                     <a:latin typeface="Arial" panose="020B0604020202020204" pitchFamily="34" charset="0"/>
                     <a:cs typeface="Arial" panose="020B0604020202020204" pitchFamily="34" charset="0"/>
                   </a:rPr>
-                  <a:t>Trick 3: quantify likelihood using a quadratic expression.</a:t>
+                  <a:t>Maneuver 3</a:t>
+                </a:r>
+                <a:r>
+                  <a:rPr lang="en-US" sz="2800" b="1" dirty="0" smtClean="0">
+                    <a:latin typeface="Arial" panose="020B0604020202020204" pitchFamily="34" charset="0"/>
+                    <a:cs typeface="Arial" panose="020B0604020202020204" pitchFamily="34" charset="0"/>
+                  </a:rPr>
+                  <a:t>: quantify likelihood using a quadratic expression.</a:t>
                 </a:r>
                 <a:endParaRPr lang="en-US" sz="2800" dirty="0" smtClean="0">
                   <a:latin typeface="Arial" panose="020B0604020202020204" pitchFamily="34" charset="0"/>
@@ -3910,8 +3986,19 @@
                     <a:latin typeface="Arial" panose="020B0604020202020204" pitchFamily="34" charset="0"/>
                     <a:cs typeface="Arial" panose="020B0604020202020204" pitchFamily="34" charset="0"/>
                   </a:rPr>
-                  <a:t>The likelihood of a particular forecast deviation is represented by its two-norm distance from the forecast itself. We can therefore express a desire to maximize likelihood with:</a:t>
+                  <a:t>The likelihood of a particular forecast deviation is represented by its two-norm distance from the forecast itself. We can therefore express a desire to maximize likelihood </a:t>
                 </a:r>
+                <a:r>
+                  <a:rPr lang="en-US" sz="2800" dirty="0" smtClean="0">
+                    <a:latin typeface="Arial" panose="020B0604020202020204" pitchFamily="34" charset="0"/>
+                    <a:cs typeface="Arial" panose="020B0604020202020204" pitchFamily="34" charset="0"/>
+                  </a:rPr>
+                  <a:t>with</a:t>
+                </a:r>
+                <a:endParaRPr lang="en-US" sz="2800" dirty="0" smtClean="0">
+                  <a:latin typeface="Arial" panose="020B0604020202020204" pitchFamily="34" charset="0"/>
+                  <a:cs typeface="Arial" panose="020B0604020202020204" pitchFamily="34" charset="0"/>
+                </a:endParaRPr>
               </a:p>
               <a:p>
                 <a:pPr algn="just">
@@ -3979,6 +4066,13 @@
                           <a:cs typeface="Arial" panose="020B0604020202020204" pitchFamily="34" charset="0"/>
                         </a:rPr>
                         <m:t>𝐐𝐳</m:t>
+                      </m:r>
+                      <m:r>
+                        <a:rPr lang="en-US" sz="2800" b="1" i="0" smtClean="0">
+                          <a:latin typeface="Cambria Math" panose="02040503050406030204" pitchFamily="18" charset="0"/>
+                          <a:cs typeface="Arial" panose="020B0604020202020204" pitchFamily="34" charset="0"/>
+                        </a:rPr>
+                        <m:t>,</m:t>
                       </m:r>
                     </m:oMath>
                   </m:oMathPara>
@@ -4073,16 +4167,16 @@
             </p:nvSpPr>
             <p:spPr>
               <a:xfrm>
-                <a:off x="914400" y="13187468"/>
+                <a:off x="914400" y="12984268"/>
                 <a:ext cx="12129099" cy="15716675"/>
               </a:xfrm>
               <a:prstGeom prst="rect">
                 <a:avLst/>
               </a:prstGeom>
               <a:blipFill rotWithShape="0">
-                <a:blip r:embed="rId4"/>
+                <a:blip r:embed="rId5"/>
                 <a:stretch>
-                  <a:fillRect l="-1005" r="-1005" b="-116"/>
+                  <a:fillRect l="-1005" r="-1005"/>
                 </a:stretch>
               </a:blipFill>
             </p:spPr>
@@ -4110,7 +4204,7 @@
         <p:spPr>
           <a:xfrm>
             <a:off x="944364" y="6704492"/>
-            <a:ext cx="8402836" cy="4832092"/>
+            <a:ext cx="8402836" cy="5262979"/>
           </a:xfrm>
           <a:prstGeom prst="rect">
             <a:avLst/>
@@ -4229,7 +4323,21 @@
                 <a:latin typeface="Arial" panose="020B0604020202020204" pitchFamily="34" charset="0"/>
                 <a:cs typeface="Arial" panose="020B0604020202020204" pitchFamily="34" charset="0"/>
               </a:rPr>
-              <a:t>Here we present the model, the QCQP and its solution, and various </a:t>
+              <a:t>Here we present the model, </a:t>
+            </a:r>
+            <a:r>
+              <a:rPr lang="en-US" sz="2800" dirty="0" smtClean="0">
+                <a:latin typeface="Arial" panose="020B0604020202020204" pitchFamily="34" charset="0"/>
+                <a:cs typeface="Arial" panose="020B0604020202020204" pitchFamily="34" charset="0"/>
+              </a:rPr>
+              <a:t>a mathematical problem formulation and </a:t>
+            </a:r>
+            <a:r>
+              <a:rPr lang="en-US" sz="2800" dirty="0" smtClean="0">
+                <a:latin typeface="Arial" panose="020B0604020202020204" pitchFamily="34" charset="0"/>
+                <a:cs typeface="Arial" panose="020B0604020202020204" pitchFamily="34" charset="0"/>
+              </a:rPr>
+              <a:t>its solution, and various </a:t>
             </a:r>
             <a:r>
               <a:rPr lang="en-US" sz="2800" dirty="0">
@@ -4280,14 +4388,7 @@
                 <a:latin typeface="Arial" panose="020B0604020202020204" pitchFamily="34" charset="0"/>
                 <a:cs typeface="Arial" panose="020B0604020202020204" pitchFamily="34" charset="0"/>
               </a:rPr>
-              <a:t>Figure </a:t>
-            </a:r>
-            <a:r>
-              <a:rPr lang="en-US" sz="2000" b="1" dirty="0" smtClean="0">
-                <a:latin typeface="Arial" panose="020B0604020202020204" pitchFamily="34" charset="0"/>
-                <a:cs typeface="Arial" panose="020B0604020202020204" pitchFamily="34" charset="0"/>
-              </a:rPr>
-              <a:t>1</a:t>
+              <a:t>Figure 1</a:t>
             </a:r>
             <a:r>
               <a:rPr lang="en-US" sz="2000" dirty="0" smtClean="0">
@@ -4313,8 +4414,8 @@
             </p:nvSpPr>
             <p:spPr>
               <a:xfrm>
-                <a:off x="944365" y="30197502"/>
-                <a:ext cx="5532635" cy="5351080"/>
+                <a:off x="944365" y="29714902"/>
+                <a:ext cx="4669035" cy="5781967"/>
               </a:xfrm>
               <a:prstGeom prst="rect">
                 <a:avLst/>
@@ -4991,16 +5092,16 @@
             </p:nvSpPr>
             <p:spPr>
               <a:xfrm>
-                <a:off x="944365" y="30197502"/>
-                <a:ext cx="5532635" cy="5351080"/>
+                <a:off x="944365" y="29714902"/>
+                <a:ext cx="4669035" cy="5781967"/>
               </a:xfrm>
               <a:prstGeom prst="rect">
                 <a:avLst/>
               </a:prstGeom>
               <a:blipFill rotWithShape="0">
-                <a:blip r:embed="rId5"/>
+                <a:blip r:embed="rId6"/>
                 <a:stretch>
-                  <a:fillRect l="-2313" t="-1254" r="-2093" b="-2281"/>
+                  <a:fillRect l="-2742" t="-1054" r="-2611" b="-1897"/>
                 </a:stretch>
               </a:blipFill>
             </p:spPr>
@@ -5027,8 +5128,8 @@
         </p:nvSpPr>
         <p:spPr>
           <a:xfrm>
-            <a:off x="7137400" y="35203532"/>
-            <a:ext cx="5994400" cy="1015663"/>
+            <a:off x="6273880" y="35228932"/>
+            <a:ext cx="6857920" cy="707886"/>
           </a:xfrm>
           <a:prstGeom prst="rect">
             <a:avLst/>
@@ -5047,14 +5148,7 @@
                 <a:latin typeface="Arial"/>
                 <a:cs typeface="Arial"/>
               </a:rPr>
-              <a:t>Figure </a:t>
-            </a:r>
-            <a:r>
-              <a:rPr lang="en-US" sz="2000" b="1" dirty="0" smtClean="0">
-                <a:latin typeface="Arial"/>
-                <a:cs typeface="Arial"/>
-              </a:rPr>
-              <a:t>4</a:t>
+              <a:t>Figure 4</a:t>
             </a:r>
             <a:r>
               <a:rPr lang="en-US" sz="2000" dirty="0" smtClean="0">
@@ -5077,134 +5171,6 @@
           </a:p>
         </p:txBody>
       </p:sp>
-      <mc:AlternateContent xmlns:mc="http://schemas.openxmlformats.org/markup-compatibility/2006">
-        <mc:Choice xmlns:a14="http://schemas.microsoft.com/office/drawing/2010/main" Requires="a14">
-          <p:sp>
-            <p:nvSpPr>
-              <p:cNvPr id="42" name="TextBox 41"/>
-              <p:cNvSpPr txBox="1"/>
-              <p:nvPr/>
-            </p:nvSpPr>
-            <p:spPr>
-              <a:xfrm>
-                <a:off x="14401800" y="25315078"/>
-                <a:ext cx="12115800" cy="1757517"/>
-              </a:xfrm>
-              <a:prstGeom prst="rect">
-                <a:avLst/>
-              </a:prstGeom>
-              <a:noFill/>
-            </p:spPr>
-            <p:txBody>
-              <a:bodyPr wrap="square" rtlCol="0">
-                <a:noAutofit/>
-              </a:bodyPr>
-              <a:lstStyle/>
-              <a:p>
-                <a:pPr algn="just"/>
-                <a14:m>
-                  <m:oMathPara xmlns:m="http://schemas.openxmlformats.org/officeDocument/2006/math">
-                    <m:oMathParaPr>
-                      <m:jc m:val="centerGroup"/>
-                    </m:oMathParaPr>
-                    <m:oMath xmlns:m="http://schemas.openxmlformats.org/officeDocument/2006/math">
-                      <m:f>
-                        <m:fPr>
-                          <m:ctrlPr>
-                            <a:rPr lang="en-US" altLang="en-US" sz="2800" i="1">
-                              <a:solidFill>
-                                <a:srgbClr val="000000"/>
-                              </a:solidFill>
-                              <a:latin typeface="Cambria Math" panose="02040503050406030204" pitchFamily="18" charset="0"/>
-                              <a:cs typeface="Arial" panose="020B0604020202020204" pitchFamily="34" charset="0"/>
-                            </a:rPr>
-                          </m:ctrlPr>
-                        </m:fPr>
-                        <m:num>
-                          <m:r>
-                            <a:rPr lang="en-US" altLang="en-US" sz="2800" i="1">
-                              <a:solidFill>
-                                <a:srgbClr val="000000"/>
-                              </a:solidFill>
-                              <a:latin typeface="Cambria Math" panose="02040503050406030204" pitchFamily="18" charset="0"/>
-                              <a:cs typeface="Arial" panose="020B0604020202020204" pitchFamily="34" charset="0"/>
-                            </a:rPr>
-                            <m:t>𝑑𝑇</m:t>
-                          </m:r>
-                        </m:num>
-                        <m:den>
-                          <m:r>
-                            <a:rPr lang="en-US" altLang="en-US" sz="2800" i="1">
-                              <a:solidFill>
-                                <a:srgbClr val="000000"/>
-                              </a:solidFill>
-                              <a:latin typeface="Cambria Math" panose="02040503050406030204" pitchFamily="18" charset="0"/>
-                              <a:cs typeface="Arial" panose="020B0604020202020204" pitchFamily="34" charset="0"/>
-                            </a:rPr>
-                            <m:t>𝑑𝑡</m:t>
-                          </m:r>
-                        </m:den>
-                      </m:f>
-                      <m:r>
-                        <a:rPr lang="en-US" altLang="en-US" sz="2800" i="1">
-                          <a:solidFill>
-                            <a:srgbClr val="000000"/>
-                          </a:solidFill>
-                          <a:latin typeface="Cambria Math" panose="02040503050406030204" pitchFamily="18" charset="0"/>
-                          <a:cs typeface="Arial" panose="020B0604020202020204" pitchFamily="34" charset="0"/>
-                        </a:rPr>
-                        <m:t>=</m:t>
-                      </m:r>
-                    </m:oMath>
-                  </m:oMathPara>
-                </a14:m>
-                <a:endParaRPr lang="en-US" sz="2800" dirty="0">
-                  <a:latin typeface="Arial" panose="020B0604020202020204" pitchFamily="34" charset="0"/>
-                  <a:cs typeface="Arial" panose="020B0604020202020204" pitchFamily="34" charset="0"/>
-                </a:endParaRPr>
-              </a:p>
-            </p:txBody>
-          </p:sp>
-        </mc:Choice>
-        <mc:Fallback>
-          <p:sp>
-            <p:nvSpPr>
-              <p:cNvPr id="42" name="TextBox 41"/>
-              <p:cNvSpPr txBox="1">
-                <a:spLocks noRot="1" noChangeAspect="1" noMove="1" noResize="1" noEditPoints="1" noAdjustHandles="1" noChangeArrowheads="1" noChangeShapeType="1" noTextEdit="1"/>
-              </p:cNvSpPr>
-              <p:nvPr/>
-            </p:nvSpPr>
-            <p:spPr>
-              <a:xfrm>
-                <a:off x="14401800" y="25315078"/>
-                <a:ext cx="12115800" cy="1757517"/>
-              </a:xfrm>
-              <a:prstGeom prst="rect">
-                <a:avLst/>
-              </a:prstGeom>
-              <a:blipFill rotWithShape="0">
-                <a:blip r:embed="rId6"/>
-                <a:stretch>
-                  <a:fillRect/>
-                </a:stretch>
-              </a:blipFill>
-            </p:spPr>
-            <p:txBody>
-              <a:bodyPr/>
-              <a:lstStyle/>
-              <a:p>
-                <a:r>
-                  <a:rPr lang="en-US">
-                    <a:noFill/>
-                  </a:rPr>
-                  <a:t> </a:t>
-                </a:r>
-              </a:p>
-            </p:txBody>
-          </p:sp>
-        </mc:Fallback>
-      </mc:AlternateContent>
       <p:sp>
         <p:nvSpPr>
           <p:cNvPr id="46" name="TextBox 45"/>
@@ -5213,7 +5179,7 @@
         </p:nvSpPr>
         <p:spPr>
           <a:xfrm>
-            <a:off x="14401800" y="30745510"/>
+            <a:off x="14401800" y="30631210"/>
             <a:ext cx="12115800" cy="2103193"/>
           </a:xfrm>
           <a:prstGeom prst="rect">
@@ -5376,8 +5342,8 @@
         </p:nvSpPr>
         <p:spPr>
           <a:xfrm>
-            <a:off x="14401800" y="34277300"/>
-            <a:ext cx="8769783" cy="1423979"/>
+            <a:off x="14401800" y="33693099"/>
+            <a:ext cx="9385300" cy="1912693"/>
           </a:xfrm>
           <a:prstGeom prst="rect">
             <a:avLst/>
@@ -5390,46 +5356,340 @@
           </a:bodyPr>
           <a:lstStyle/>
           <a:p>
-            <a:pPr algn="just"/>
-            <a:r>
-              <a:rPr lang="en-US" sz="2800" dirty="0" smtClean="0">
+            <a:pPr defTabSz="457200"/>
+            <a:r>
+              <a:rPr lang="en-US" sz="2000" dirty="0">
                 <a:latin typeface="Arial" pitchFamily="34" charset="0"/>
                 <a:cs typeface="Arial" pitchFamily="34" charset="0"/>
               </a:rPr>
-              <a:t>[1] </a:t>
-            </a:r>
-            <a:r>
-              <a:rPr lang="en-US" sz="2800" dirty="0" err="1" smtClean="0">
+              <a:t>[</a:t>
+            </a:r>
+            <a:r>
+              <a:rPr lang="en-US" sz="2000" dirty="0" smtClean="0">
                 <a:latin typeface="Arial" pitchFamily="34" charset="0"/>
                 <a:cs typeface="Arial" pitchFamily="34" charset="0"/>
               </a:rPr>
-              <a:t>PowerTech</a:t>
-            </a:r>
-            <a:r>
-              <a:rPr lang="en-US" sz="2800" dirty="0" smtClean="0">
+              <a:t>1]  J</a:t>
+            </a:r>
+            <a:r>
+              <a:rPr lang="en-US" sz="2000" dirty="0">
                 <a:latin typeface="Arial" pitchFamily="34" charset="0"/>
                 <a:cs typeface="Arial" pitchFamily="34" charset="0"/>
               </a:rPr>
-              <a:t> paper</a:t>
-            </a:r>
-          </a:p>
-          <a:p>
-            <a:pPr algn="just"/>
-            <a:r>
-              <a:rPr lang="en-US" sz="2800" dirty="0" smtClean="0">
+              <a:t>. Kersulis, I. </a:t>
+            </a:r>
+            <a:r>
+              <a:rPr lang="en-US" sz="2000" dirty="0" err="1">
                 <a:latin typeface="Arial" pitchFamily="34" charset="0"/>
                 <a:cs typeface="Arial" pitchFamily="34" charset="0"/>
               </a:rPr>
-              <a:t>[2] Mads paper</a:t>
-            </a:r>
-            <a:endParaRPr lang="en-US" sz="2800" dirty="0" smtClean="0">
-              <a:latin typeface="Arial" pitchFamily="34" charset="0"/>
-              <a:cs typeface="Arial" pitchFamily="34" charset="0"/>
-            </a:endParaRPr>
-          </a:p>
-          <a:p>
-            <a:pPr algn="just"/>
-            <a:endParaRPr lang="en-US" sz="2800" dirty="0" smtClean="0">
+              <a:t>Hiskens</a:t>
+            </a:r>
+            <a:r>
+              <a:rPr lang="en-US" sz="2000" dirty="0">
+                <a:latin typeface="Arial" pitchFamily="34" charset="0"/>
+                <a:cs typeface="Arial" pitchFamily="34" charset="0"/>
+              </a:rPr>
+              <a:t>, M. Chertkov, S. Backhaus, and </a:t>
+            </a:r>
+            <a:r>
+              <a:rPr lang="en-US" sz="2000" dirty="0" smtClean="0">
+                <a:latin typeface="Arial" pitchFamily="34" charset="0"/>
+                <a:cs typeface="Arial" pitchFamily="34" charset="0"/>
+              </a:rPr>
+              <a:t>D</a:t>
+            </a:r>
+            <a:r>
+              <a:rPr lang="en-US" sz="2000" dirty="0">
+                <a:latin typeface="Arial" pitchFamily="34" charset="0"/>
+                <a:cs typeface="Arial" pitchFamily="34" charset="0"/>
+              </a:rPr>
+              <a:t>. </a:t>
+            </a:r>
+            <a:r>
+              <a:rPr lang="en-US" sz="2000" dirty="0" err="1" smtClean="0">
+                <a:latin typeface="Arial" pitchFamily="34" charset="0"/>
+                <a:cs typeface="Arial" pitchFamily="34" charset="0"/>
+              </a:rPr>
+              <a:t>Bienstock</a:t>
+            </a:r>
+            <a:r>
+              <a:rPr lang="en-US" sz="2000" dirty="0">
+                <a:latin typeface="Arial" pitchFamily="34" charset="0"/>
+                <a:cs typeface="Arial" pitchFamily="34" charset="0"/>
+              </a:rPr>
+              <a:t>, </a:t>
+            </a:r>
+            <a:r>
+              <a:rPr lang="en-US" sz="2000" dirty="0" smtClean="0">
+                <a:latin typeface="Arial" pitchFamily="34" charset="0"/>
+                <a:cs typeface="Arial" pitchFamily="34" charset="0"/>
+              </a:rPr>
+              <a:t>“Temp-	</a:t>
+            </a:r>
+            <a:r>
+              <a:rPr lang="en-US" sz="2000" dirty="0" err="1" smtClean="0">
+                <a:latin typeface="Arial" pitchFamily="34" charset="0"/>
+                <a:cs typeface="Arial" pitchFamily="34" charset="0"/>
+              </a:rPr>
+              <a:t>erature</a:t>
+            </a:r>
+            <a:r>
+              <a:rPr lang="en-US" sz="2000" dirty="0" smtClean="0">
+                <a:latin typeface="Arial" pitchFamily="34" charset="0"/>
+                <a:cs typeface="Arial" pitchFamily="34" charset="0"/>
+              </a:rPr>
+              <a:t>-based </a:t>
+            </a:r>
+            <a:r>
+              <a:rPr lang="en-US" sz="2000" dirty="0">
+                <a:latin typeface="Arial" pitchFamily="34" charset="0"/>
+                <a:cs typeface="Arial" pitchFamily="34" charset="0"/>
+              </a:rPr>
+              <a:t>instanton </a:t>
+            </a:r>
+            <a:r>
+              <a:rPr lang="en-US" sz="2000" dirty="0" smtClean="0">
+                <a:latin typeface="Arial" pitchFamily="34" charset="0"/>
+                <a:cs typeface="Arial" pitchFamily="34" charset="0"/>
+              </a:rPr>
+              <a:t>analysis</a:t>
+            </a:r>
+            <a:r>
+              <a:rPr lang="en-US" sz="2000" dirty="0">
+                <a:latin typeface="Arial" pitchFamily="34" charset="0"/>
+                <a:cs typeface="Arial" pitchFamily="34" charset="0"/>
+              </a:rPr>
+              <a:t>: Identifying vulnerability in </a:t>
+            </a:r>
+            <a:r>
+              <a:rPr lang="en-US" sz="2000" dirty="0" smtClean="0">
+                <a:latin typeface="Arial" pitchFamily="34" charset="0"/>
+                <a:cs typeface="Arial" pitchFamily="34" charset="0"/>
+              </a:rPr>
+              <a:t>	transmission 	networks</a:t>
+            </a:r>
+            <a:r>
+              <a:rPr lang="en-US" sz="2000" dirty="0">
+                <a:latin typeface="Arial" pitchFamily="34" charset="0"/>
+                <a:cs typeface="Arial" pitchFamily="34" charset="0"/>
+              </a:rPr>
+              <a:t>,” in </a:t>
+            </a:r>
+            <a:r>
+              <a:rPr lang="en-US" sz="2000" dirty="0" smtClean="0">
+                <a:latin typeface="Arial" pitchFamily="34" charset="0"/>
+                <a:cs typeface="Arial" pitchFamily="34" charset="0"/>
+              </a:rPr>
+              <a:t>IEEE </a:t>
+            </a:r>
+            <a:r>
+              <a:rPr lang="en-US" sz="2000" dirty="0" err="1" smtClean="0">
+                <a:latin typeface="Arial" pitchFamily="34" charset="0"/>
+                <a:cs typeface="Arial" pitchFamily="34" charset="0"/>
+              </a:rPr>
+              <a:t>PowerTech</a:t>
+            </a:r>
+            <a:r>
+              <a:rPr lang="en-US" sz="2000" dirty="0" smtClean="0">
+                <a:latin typeface="Arial" pitchFamily="34" charset="0"/>
+                <a:cs typeface="Arial" pitchFamily="34" charset="0"/>
+              </a:rPr>
+              <a:t> 2015 Eindhoven, </a:t>
+            </a:r>
+            <a:r>
+              <a:rPr lang="en-US" sz="2000" dirty="0">
+                <a:latin typeface="Arial" pitchFamily="34" charset="0"/>
+                <a:cs typeface="Arial" pitchFamily="34" charset="0"/>
+              </a:rPr>
+              <a:t>Jun. </a:t>
+            </a:r>
+            <a:r>
+              <a:rPr lang="en-US" sz="2000" dirty="0" smtClean="0">
+                <a:latin typeface="Arial" pitchFamily="34" charset="0"/>
+                <a:cs typeface="Arial" pitchFamily="34" charset="0"/>
+              </a:rPr>
+              <a:t>2015</a:t>
+            </a:r>
+            <a:r>
+              <a:rPr lang="en-US" sz="2000" dirty="0">
+                <a:latin typeface="Arial" pitchFamily="34" charset="0"/>
+                <a:cs typeface="Arial" pitchFamily="34" charset="0"/>
+              </a:rPr>
+              <a:t>, </a:t>
+            </a:r>
+            <a:r>
+              <a:rPr lang="en-US" sz="2000" dirty="0" smtClean="0">
+                <a:latin typeface="Arial" pitchFamily="34" charset="0"/>
+                <a:cs typeface="Arial" pitchFamily="34" charset="0"/>
+              </a:rPr>
+              <a:t>	pp</a:t>
+            </a:r>
+            <a:r>
+              <a:rPr lang="en-US" sz="2000" dirty="0">
+                <a:latin typeface="Arial" pitchFamily="34" charset="0"/>
+                <a:cs typeface="Arial" pitchFamily="34" charset="0"/>
+              </a:rPr>
+              <a:t>. 1–6. </a:t>
+            </a:r>
+          </a:p>
+          <a:p>
+            <a:pPr defTabSz="457200"/>
+            <a:r>
+              <a:rPr lang="en-US" sz="2000" dirty="0" smtClean="0">
+                <a:latin typeface="Arial" pitchFamily="34" charset="0"/>
+                <a:cs typeface="Arial" pitchFamily="34" charset="0"/>
+              </a:rPr>
+              <a:t>[2</a:t>
+            </a:r>
+            <a:r>
+              <a:rPr lang="en-US" sz="2000" dirty="0">
+                <a:latin typeface="Arial" pitchFamily="34" charset="0"/>
+                <a:cs typeface="Arial" pitchFamily="34" charset="0"/>
+              </a:rPr>
+              <a:t>] </a:t>
+            </a:r>
+            <a:r>
+              <a:rPr lang="en-US" sz="2000" dirty="0" smtClean="0">
+                <a:latin typeface="Arial" pitchFamily="34" charset="0"/>
+                <a:cs typeface="Arial" pitchFamily="34" charset="0"/>
+              </a:rPr>
+              <a:t> M</a:t>
+            </a:r>
+            <a:r>
+              <a:rPr lang="en-US" sz="2000" dirty="0">
+                <a:latin typeface="Arial" pitchFamily="34" charset="0"/>
+                <a:cs typeface="Arial" pitchFamily="34" charset="0"/>
+              </a:rPr>
+              <a:t>. Almassalkhi and I. </a:t>
+            </a:r>
+            <a:r>
+              <a:rPr lang="en-US" sz="2000" dirty="0" err="1">
+                <a:latin typeface="Arial" pitchFamily="34" charset="0"/>
+                <a:cs typeface="Arial" pitchFamily="34" charset="0"/>
+              </a:rPr>
+              <a:t>Hiskens</a:t>
+            </a:r>
+            <a:r>
+              <a:rPr lang="en-US" sz="2000" dirty="0">
+                <a:latin typeface="Arial" pitchFamily="34" charset="0"/>
+                <a:cs typeface="Arial" pitchFamily="34" charset="0"/>
+              </a:rPr>
+              <a:t>, “Model-predictive </a:t>
+            </a:r>
+            <a:r>
+              <a:rPr lang="en-US" sz="2000" dirty="0" smtClean="0">
+                <a:latin typeface="Arial" pitchFamily="34" charset="0"/>
+                <a:cs typeface="Arial" pitchFamily="34" charset="0"/>
+              </a:rPr>
+              <a:t>cascade </a:t>
+            </a:r>
+            <a:r>
+              <a:rPr lang="en-US" sz="2000" dirty="0">
+                <a:latin typeface="Arial" pitchFamily="34" charset="0"/>
+                <a:cs typeface="Arial" pitchFamily="34" charset="0"/>
+              </a:rPr>
+              <a:t>mitigation in </a:t>
+            </a:r>
+            <a:r>
+              <a:rPr lang="en-US" sz="2000" dirty="0" smtClean="0">
+                <a:latin typeface="Arial" pitchFamily="34" charset="0"/>
+                <a:cs typeface="Arial" pitchFamily="34" charset="0"/>
+              </a:rPr>
+              <a:t>electric 	power </a:t>
+            </a:r>
+            <a:r>
+              <a:rPr lang="en-US" sz="2000" dirty="0">
+                <a:latin typeface="Arial" pitchFamily="34" charset="0"/>
+                <a:cs typeface="Arial" pitchFamily="34" charset="0"/>
+              </a:rPr>
+              <a:t>systems </a:t>
+            </a:r>
+            <a:r>
+              <a:rPr lang="en-US" sz="2000" dirty="0" smtClean="0">
+                <a:latin typeface="Arial" pitchFamily="34" charset="0"/>
+                <a:cs typeface="Arial" pitchFamily="34" charset="0"/>
+              </a:rPr>
+              <a:t>with	storage </a:t>
+            </a:r>
+            <a:r>
+              <a:rPr lang="en-US" sz="2000" dirty="0">
+                <a:latin typeface="Arial" pitchFamily="34" charset="0"/>
+                <a:cs typeface="Arial" pitchFamily="34" charset="0"/>
+              </a:rPr>
+              <a:t>and renewables – part </a:t>
+            </a:r>
+            <a:r>
+              <a:rPr lang="en-US" sz="2000" dirty="0" smtClean="0">
+                <a:latin typeface="Arial" pitchFamily="34" charset="0"/>
+                <a:cs typeface="Arial" pitchFamily="34" charset="0"/>
+              </a:rPr>
+              <a:t>I: Theory and </a:t>
+            </a:r>
+            <a:r>
+              <a:rPr lang="en-US" sz="2000" dirty="0" err="1" smtClean="0">
+                <a:latin typeface="Arial" pitchFamily="34" charset="0"/>
+                <a:cs typeface="Arial" pitchFamily="34" charset="0"/>
+              </a:rPr>
+              <a:t>implementa</a:t>
+            </a:r>
+            <a:r>
+              <a:rPr lang="en-US" sz="2000" dirty="0" smtClean="0">
+                <a:latin typeface="Arial" pitchFamily="34" charset="0"/>
+                <a:cs typeface="Arial" pitchFamily="34" charset="0"/>
+              </a:rPr>
+              <a:t>-	</a:t>
+            </a:r>
+            <a:r>
+              <a:rPr lang="en-US" sz="2000" dirty="0" err="1" smtClean="0">
+                <a:latin typeface="Arial" pitchFamily="34" charset="0"/>
+                <a:cs typeface="Arial" pitchFamily="34" charset="0"/>
+              </a:rPr>
+              <a:t>tion</a:t>
+            </a:r>
+            <a:r>
+              <a:rPr lang="en-US" sz="2000" dirty="0">
+                <a:latin typeface="Arial" pitchFamily="34" charset="0"/>
+                <a:cs typeface="Arial" pitchFamily="34" charset="0"/>
+              </a:rPr>
+              <a:t>,” IEEE Transactions on Power </a:t>
+            </a:r>
+            <a:r>
+              <a:rPr lang="en-US" sz="2000" dirty="0" smtClean="0">
+                <a:latin typeface="Arial" pitchFamily="34" charset="0"/>
+                <a:cs typeface="Arial" pitchFamily="34" charset="0"/>
+              </a:rPr>
+              <a:t>Systems</a:t>
+            </a:r>
+            <a:r>
+              <a:rPr lang="en-US" sz="2000" dirty="0">
+                <a:latin typeface="Arial" pitchFamily="34" charset="0"/>
+                <a:cs typeface="Arial" pitchFamily="34" charset="0"/>
+              </a:rPr>
+              <a:t>, vol. PP, no. 99, pp. </a:t>
+            </a:r>
+            <a:r>
+              <a:rPr lang="en-US" sz="2000" dirty="0" smtClean="0">
+                <a:latin typeface="Arial" pitchFamily="34" charset="0"/>
+                <a:cs typeface="Arial" pitchFamily="34" charset="0"/>
+              </a:rPr>
+              <a:t>1–11</a:t>
+            </a:r>
+            <a:r>
+              <a:rPr lang="en-US" sz="2000" dirty="0">
+                <a:latin typeface="Arial" pitchFamily="34" charset="0"/>
+                <a:cs typeface="Arial" pitchFamily="34" charset="0"/>
+              </a:rPr>
+              <a:t>, 2014</a:t>
+            </a:r>
+            <a:r>
+              <a:rPr lang="en-US" sz="2000" dirty="0" smtClean="0">
+                <a:latin typeface="Arial" pitchFamily="34" charset="0"/>
+                <a:cs typeface="Arial" pitchFamily="34" charset="0"/>
+              </a:rPr>
+              <a:t>.</a:t>
+            </a:r>
+            <a:endParaRPr lang="en-US" sz="2000" dirty="0" smtClean="0">
               <a:latin typeface="Arial" pitchFamily="34" charset="0"/>
               <a:cs typeface="Arial" pitchFamily="34" charset="0"/>
             </a:endParaRPr>
@@ -5500,10 +5760,6 @@
               </a:rPr>
               <a:t>Vulnerability in Transmission Networks</a:t>
             </a:r>
-            <a:endParaRPr lang="en-US" dirty="0">
-              <a:latin typeface="Arial" pitchFamily="34" charset="0"/>
-              <a:cs typeface="Arial" pitchFamily="34" charset="0"/>
-            </a:endParaRPr>
           </a:p>
         </p:txBody>
       </p:sp>
@@ -5653,7 +5909,7 @@
         </p:nvSpPr>
         <p:spPr>
           <a:xfrm>
-            <a:off x="919234" y="12006562"/>
+            <a:off x="919234" y="12108162"/>
             <a:ext cx="12115800" cy="830997"/>
           </a:xfrm>
           <a:prstGeom prst="rect">
@@ -5677,7 +5933,17 @@
                 <a:latin typeface="Arial"/>
                 <a:cs typeface="Arial"/>
               </a:rPr>
-              <a:t>Three Models, Three Tricks</a:t>
+              <a:t>Three Models, </a:t>
+            </a:r>
+            <a:r>
+              <a:rPr lang="en-US" sz="4800" b="1" dirty="0" smtClean="0">
+                <a:solidFill>
+                  <a:srgbClr val="F8C728"/>
+                </a:solidFill>
+                <a:latin typeface="Arial"/>
+                <a:cs typeface="Arial"/>
+              </a:rPr>
+              <a:t>Three Maneuvers</a:t>
             </a:r>
             <a:endParaRPr lang="en-US" sz="4800" b="1" dirty="0">
               <a:solidFill>
@@ -5697,7 +5963,7 @@
         </p:nvSpPr>
         <p:spPr>
           <a:xfrm>
-            <a:off x="922057" y="29060672"/>
+            <a:off x="922057" y="28578072"/>
             <a:ext cx="12115800" cy="830997"/>
           </a:xfrm>
           <a:prstGeom prst="rect">
@@ -5735,57 +6001,13 @@
       </p:sp>
       <p:sp>
         <p:nvSpPr>
-          <p:cNvPr id="75" name="TextBox 74"/>
-          <p:cNvSpPr txBox="1"/>
-          <p:nvPr/>
-        </p:nvSpPr>
-        <p:spPr>
-          <a:xfrm>
-            <a:off x="14401800" y="24060727"/>
-            <a:ext cx="12115800" cy="830997"/>
-          </a:xfrm>
-          <a:prstGeom prst="rect">
-            <a:avLst/>
-          </a:prstGeom>
-          <a:solidFill>
-            <a:srgbClr val="03204F"/>
-          </a:solidFill>
-        </p:spPr>
-        <p:txBody>
-          <a:bodyPr wrap="square" rtlCol="0" anchor="ctr">
-            <a:spAutoFit/>
-          </a:bodyPr>
-          <a:lstStyle/>
-          <a:p>
-            <a:r>
-              <a:rPr lang="en-US" sz="4800" b="1" dirty="0" smtClean="0">
-                <a:solidFill>
-                  <a:srgbClr val="F8C728"/>
-                </a:solidFill>
-                <a:latin typeface="Arial"/>
-                <a:cs typeface="Arial"/>
-              </a:rPr>
-              <a:t>Results</a:t>
-            </a:r>
-            <a:endParaRPr lang="en-US" sz="4800" b="1" dirty="0">
-              <a:solidFill>
-                <a:srgbClr val="F8C728"/>
-              </a:solidFill>
-              <a:latin typeface="Arial"/>
-              <a:cs typeface="Arial"/>
-            </a:endParaRPr>
-          </a:p>
-        </p:txBody>
-      </p:sp>
-      <p:sp>
-        <p:nvSpPr>
           <p:cNvPr id="77" name="TextBox 76"/>
           <p:cNvSpPr txBox="1"/>
           <p:nvPr/>
         </p:nvSpPr>
         <p:spPr>
           <a:xfrm>
-            <a:off x="14401800" y="29809641"/>
+            <a:off x="14401800" y="29676291"/>
             <a:ext cx="12115800" cy="830997"/>
           </a:xfrm>
           <a:prstGeom prst="rect">
@@ -5860,8 +6082,8 @@
         </p:blipFill>
         <p:spPr>
           <a:xfrm>
-            <a:off x="14319504" y="17511153"/>
-            <a:ext cx="6254496" cy="5212080"/>
+            <a:off x="14401799" y="23993493"/>
+            <a:ext cx="6459353" cy="5382794"/>
           </a:xfrm>
           <a:prstGeom prst="rect">
             <a:avLst/>
@@ -5890,8 +6112,8 @@
         </p:blipFill>
         <p:spPr>
           <a:xfrm>
-            <a:off x="20243799" y="10472509"/>
-            <a:ext cx="6958653" cy="5218990"/>
+            <a:off x="18943320" y="10435851"/>
+            <a:ext cx="8396294" cy="6297221"/>
           </a:xfrm>
           <a:prstGeom prst="rect">
             <a:avLst/>
@@ -5906,8 +6128,8 @@
         </p:nvSpPr>
         <p:spPr>
           <a:xfrm>
-            <a:off x="20345399" y="17989225"/>
-            <a:ext cx="6172200" cy="5874076"/>
+            <a:off x="14454555" y="18630575"/>
+            <a:ext cx="12044626" cy="1008993"/>
           </a:xfrm>
           <a:prstGeom prst="rect">
             <a:avLst/>
@@ -5920,48 +6142,76 @@
           </a:bodyPr>
           <a:lstStyle/>
           <a:p>
-            <a:pPr algn="just"/>
+            <a:pPr marL="457200" indent="-457200" algn="just">
+              <a:buFont typeface="Arial" panose="020B0604020202020204" pitchFamily="34" charset="0"/>
+              <a:buChar char="•"/>
+            </a:pPr>
             <a:r>
               <a:rPr lang="en-US" sz="2800" dirty="0" smtClean="0">
                 <a:latin typeface="Arial" panose="020B0604020202020204" pitchFamily="34" charset="0"/>
                 <a:cs typeface="Arial" panose="020B0604020202020204" pitchFamily="34" charset="0"/>
               </a:rPr>
-              <a:t>Solution time is dominated by multiplication and factorization.</a:t>
-            </a:r>
-          </a:p>
-          <a:p>
-            <a:pPr algn="just"/>
-            <a:endParaRPr lang="en-US" sz="2800" dirty="0">
+              <a:t>Sparsity-preserving </a:t>
+            </a:r>
+            <a:r>
+              <a:rPr lang="en-US" sz="2800" dirty="0" smtClean="0">
+                <a:latin typeface="Arial" panose="020B0604020202020204" pitchFamily="34" charset="0"/>
+                <a:cs typeface="Arial" panose="020B0604020202020204" pitchFamily="34" charset="0"/>
+              </a:rPr>
+              <a:t>methods dramatically </a:t>
+            </a:r>
+            <a:r>
+              <a:rPr lang="en-US" sz="2800" dirty="0" smtClean="0">
+                <a:latin typeface="Arial" panose="020B0604020202020204" pitchFamily="34" charset="0"/>
+                <a:cs typeface="Arial" panose="020B0604020202020204" pitchFamily="34" charset="0"/>
+              </a:rPr>
+              <a:t>reduce requirements.</a:t>
+            </a:r>
+          </a:p>
+          <a:p>
+            <a:pPr marL="457200" indent="-457200" algn="just">
+              <a:buFont typeface="Arial" panose="020B0604020202020204" pitchFamily="34" charset="0"/>
+              <a:buChar char="•"/>
+            </a:pPr>
+            <a:r>
+              <a:rPr lang="en-US" sz="2800" dirty="0" smtClean="0">
+                <a:latin typeface="Arial" panose="020B0604020202020204" pitchFamily="34" charset="0"/>
+                <a:cs typeface="Arial" panose="020B0604020202020204" pitchFamily="34" charset="0"/>
+              </a:rPr>
+              <a:t>Temporal instanton </a:t>
+            </a:r>
+            <a:r>
+              <a:rPr lang="en-US" sz="2800" dirty="0" smtClean="0">
+                <a:latin typeface="Arial" panose="020B0604020202020204" pitchFamily="34" charset="0"/>
+                <a:cs typeface="Arial" panose="020B0604020202020204" pitchFamily="34" charset="0"/>
+              </a:rPr>
+              <a:t>analysis </a:t>
+            </a:r>
+            <a:r>
+              <a:rPr lang="en-US" sz="2800" dirty="0" smtClean="0">
+                <a:latin typeface="Arial" panose="020B0604020202020204" pitchFamily="34" charset="0"/>
+                <a:cs typeface="Arial" panose="020B0604020202020204" pitchFamily="34" charset="0"/>
+              </a:rPr>
+              <a:t>is triviall</a:t>
+            </a:r>
+            <a:r>
+              <a:rPr lang="en-US" sz="2800" dirty="0" smtClean="0">
+                <a:latin typeface="Arial" panose="020B0604020202020204" pitchFamily="34" charset="0"/>
+                <a:cs typeface="Arial" panose="020B0604020202020204" pitchFamily="34" charset="0"/>
+              </a:rPr>
+              <a:t>y parallelizable</a:t>
+            </a:r>
+            <a:r>
+              <a:rPr lang="en-US" sz="2800" dirty="0" smtClean="0">
+                <a:latin typeface="Arial" panose="020B0604020202020204" pitchFamily="34" charset="0"/>
+                <a:cs typeface="Arial" panose="020B0604020202020204" pitchFamily="34" charset="0"/>
+              </a:rPr>
+              <a:t>.</a:t>
+            </a:r>
+            <a:endParaRPr lang="en-US" sz="2800" dirty="0" smtClean="0">
               <a:latin typeface="Arial" panose="020B0604020202020204" pitchFamily="34" charset="0"/>
               <a:cs typeface="Arial" panose="020B0604020202020204" pitchFamily="34" charset="0"/>
             </a:endParaRPr>
-          </a:p>
-          <a:p>
-            <a:pPr algn="just"/>
-            <a:r>
-              <a:rPr lang="en-US" sz="2800" dirty="0" smtClean="0">
-                <a:latin typeface="Arial" panose="020B0604020202020204" pitchFamily="34" charset="0"/>
-                <a:cs typeface="Arial" panose="020B0604020202020204" pitchFamily="34" charset="0"/>
-              </a:rPr>
-              <a:t>Use of sparsity-preserving methods dramatically reduces storage and computation requirements.</a:t>
-            </a:r>
-          </a:p>
-          <a:p>
-            <a:pPr algn="just"/>
-            <a:endParaRPr lang="en-US" sz="2800" dirty="0">
-              <a:latin typeface="Arial" panose="020B0604020202020204" pitchFamily="34" charset="0"/>
-              <a:cs typeface="Arial" panose="020B0604020202020204" pitchFamily="34" charset="0"/>
-            </a:endParaRPr>
-          </a:p>
-          <a:p>
-            <a:pPr algn="just"/>
-            <a:r>
-              <a:rPr lang="en-US" sz="2800" dirty="0" smtClean="0">
-                <a:latin typeface="Arial" panose="020B0604020202020204" pitchFamily="34" charset="0"/>
-                <a:cs typeface="Arial" panose="020B0604020202020204" pitchFamily="34" charset="0"/>
-              </a:rPr>
-              <a:t>Because each line’s analysis is independent from all others, temporal instanton analysis is easily parallelized.</a:t>
-            </a:r>
           </a:p>
         </p:txBody>
       </p:sp>
@@ -5973,7 +6223,7 @@
         </p:nvSpPr>
         <p:spPr>
           <a:xfrm>
-            <a:off x="14401800" y="16717777"/>
+            <a:off x="14401800" y="17549627"/>
             <a:ext cx="12115800" cy="830997"/>
           </a:xfrm>
           <a:prstGeom prst="rect">
@@ -6009,8 +6259,8 @@
           </a:p>
         </p:txBody>
       </p:sp>
-      <mc:AlternateContent xmlns:mc="http://schemas.openxmlformats.org/markup-compatibility/2006">
-        <mc:Choice xmlns:a14="http://schemas.microsoft.com/office/drawing/2010/main" Requires="a14">
+      <mc:AlternateContent xmlns:mc="http://schemas.openxmlformats.org/markup-compatibility/2006" xmlns:a14="http://schemas.microsoft.com/office/drawing/2010/main">
+        <mc:Choice Requires="a14">
           <p:sp>
             <p:nvSpPr>
               <p:cNvPr id="48" name="TextBox 47"/>
@@ -6549,17 +6799,7 @@
                     <a:latin typeface="Arial" panose="020B0604020202020204" pitchFamily="34" charset="0"/>
                     <a:cs typeface="Arial" panose="020B0604020202020204" pitchFamily="34" charset="0"/>
                   </a:rPr>
-                  <a:t> </a:t>
-                </a:r>
-                <a:r>
-                  <a:rPr lang="en-US" altLang="en-US" sz="2800" dirty="0">
-                    <a:solidFill>
-                      <a:srgbClr val="000000"/>
-                    </a:solidFill>
-                    <a:latin typeface="Arial" panose="020B0604020202020204" pitchFamily="34" charset="0"/>
-                    <a:cs typeface="Arial" panose="020B0604020202020204" pitchFamily="34" charset="0"/>
-                  </a:rPr>
-                  <a:t>to </a:t>
+                  <a:t> to </a:t>
                 </a:r>
                 <a14:m>
                   <m:oMath xmlns:m="http://schemas.openxmlformats.org/officeDocument/2006/math">
@@ -6583,17 +6823,7 @@
                     <a:latin typeface="Arial" panose="020B0604020202020204" pitchFamily="34" charset="0"/>
                     <a:cs typeface="Arial" panose="020B0604020202020204" pitchFamily="34" charset="0"/>
                   </a:rPr>
-                  <a:t>, </a:t>
-                </a:r>
-                <a:r>
-                  <a:rPr lang="en-US" altLang="en-US" sz="2800" dirty="0">
-                    <a:solidFill>
-                      <a:srgbClr val="000000"/>
-                    </a:solidFill>
-                    <a:latin typeface="Arial" panose="020B0604020202020204" pitchFamily="34" charset="0"/>
-                    <a:cs typeface="Arial" panose="020B0604020202020204" pitchFamily="34" charset="0"/>
-                  </a:rPr>
-                  <a:t>where </a:t>
+                  <a:t>, where </a:t>
                 </a:r>
                 <a14:m>
                   <m:oMath xmlns:m="http://schemas.openxmlformats.org/officeDocument/2006/math">
@@ -6939,7 +7169,7 @@
                           <m:sSup>
                             <m:sSupPr>
                               <m:ctrlPr>
-                                <a:rPr lang="en-US" altLang="en-US" sz="2800" b="1">
+                                <a:rPr lang="en-US" altLang="en-US" sz="2800" b="1" i="1">
                                   <a:solidFill>
                                     <a:srgbClr val="000000"/>
                                   </a:solidFill>
@@ -7226,7 +7456,7 @@
             </p:txBody>
           </p:sp>
         </mc:Choice>
-        <mc:Fallback>
+        <mc:Fallback xmlns="">
           <p:sp>
             <p:nvSpPr>
               <p:cNvPr id="48" name="TextBox 47"/>
@@ -7317,7 +7547,7 @@
         </p:nvSpPr>
         <p:spPr>
           <a:xfrm>
-            <a:off x="20574000" y="15624855"/>
+            <a:off x="20363817" y="16598738"/>
             <a:ext cx="6135364" cy="707886"/>
           </a:xfrm>
           <a:prstGeom prst="rect">
@@ -7344,14 +7574,7 @@
                 <a:latin typeface="Arial"/>
                 <a:cs typeface="Arial"/>
               </a:rPr>
-              <a:t>: </a:t>
-            </a:r>
-            <a:r>
-              <a:rPr lang="en-US" sz="2000" dirty="0" smtClean="0">
-                <a:latin typeface="Arial"/>
-                <a:cs typeface="Arial"/>
-              </a:rPr>
-              <a:t>A secular equation taken from RTS-96 analysis with six time steps.</a:t>
+              <a:t>: A secular equation taken from RTS-96 analysis with six time steps.</a:t>
             </a:r>
             <a:endParaRPr lang="en-US" sz="2000" dirty="0">
               <a:latin typeface="Arial"/>
@@ -7368,8 +7591,8 @@
         </p:nvSpPr>
         <p:spPr>
           <a:xfrm>
-            <a:off x="14556222" y="22748633"/>
-            <a:ext cx="5634752" cy="1323439"/>
+            <a:off x="14649466" y="20022869"/>
+            <a:ext cx="5771501" cy="4093428"/>
           </a:xfrm>
           <a:prstGeom prst="rect">
             <a:avLst/>
@@ -7388,26 +7611,144 @@
                 <a:latin typeface="Arial"/>
                 <a:cs typeface="Arial"/>
               </a:rPr>
-              <a:t>Figure </a:t>
-            </a:r>
+              <a:t>Figure 3</a:t>
+            </a:r>
+            <a:r>
+              <a:rPr lang="en-US" sz="2000" dirty="0" smtClean="0">
+                <a:latin typeface="Arial"/>
+                <a:cs typeface="Arial"/>
+              </a:rPr>
+              <a:t>: </a:t>
+            </a:r>
+            <a:r>
+              <a:rPr lang="en-US" sz="2000" dirty="0" smtClean="0">
+                <a:latin typeface="Arial"/>
+                <a:cs typeface="Arial"/>
+              </a:rPr>
+              <a:t>QCQP solution algorithm scaling. </a:t>
+            </a:r>
+          </a:p>
+          <a:p>
+            <a:pPr algn="ctr"/>
             <a:r>
               <a:rPr lang="en-US" sz="2000" b="1" dirty="0" smtClean="0">
                 <a:latin typeface="Arial"/>
                 <a:cs typeface="Arial"/>
               </a:rPr>
-              <a:t>3</a:t>
+              <a:t>Right: </a:t>
             </a:r>
             <a:r>
               <a:rPr lang="en-US" sz="2000" dirty="0" smtClean="0">
                 <a:latin typeface="Arial"/>
                 <a:cs typeface="Arial"/>
               </a:rPr>
-              <a:t>: QCQP algorithm scaling for RTS-96 analysis. Each gray dash represents a different (random) wind farm placement.</a:t>
-            </a:r>
-            <a:endParaRPr lang="en-US" sz="2000" dirty="0">
-              <a:latin typeface="Arial"/>
-              <a:cs typeface="Arial"/>
-            </a:endParaRPr>
+              <a:t>Storage and processing requirements for various numbers of worker processes, with and without sparse QR factorization. </a:t>
+            </a:r>
+            <a:r>
+              <a:rPr lang="en-US" sz="2000" b="1" dirty="0" smtClean="0">
+                <a:latin typeface="Arial"/>
+                <a:cs typeface="Arial"/>
+              </a:rPr>
+              <a:t>Bottom </a:t>
+            </a:r>
+            <a:r>
+              <a:rPr lang="en-US" sz="2000" b="1" dirty="0" smtClean="0">
+                <a:latin typeface="Arial"/>
+                <a:cs typeface="Arial"/>
+              </a:rPr>
+              <a:t>Left:</a:t>
+            </a:r>
+            <a:r>
+              <a:rPr lang="en-US" sz="2000" dirty="0" smtClean="0">
+                <a:latin typeface="Arial"/>
+                <a:cs typeface="Arial"/>
+              </a:rPr>
+              <a:t> RTS-96 analysis with 2-72 wind farms. </a:t>
+            </a:r>
+            <a:r>
+              <a:rPr lang="en-US" sz="2000" dirty="0" smtClean="0">
+                <a:latin typeface="Arial"/>
+                <a:cs typeface="Arial"/>
+              </a:rPr>
+              <a:t>Each </a:t>
+            </a:r>
+            <a:r>
+              <a:rPr lang="en-US" sz="2000" dirty="0" smtClean="0">
+                <a:latin typeface="Arial"/>
+                <a:cs typeface="Arial"/>
+              </a:rPr>
+              <a:t>dash </a:t>
+            </a:r>
+            <a:r>
+              <a:rPr lang="en-US" sz="2000" dirty="0" smtClean="0">
+                <a:latin typeface="Arial"/>
+                <a:cs typeface="Arial"/>
+              </a:rPr>
+              <a:t>represents a different (random) wind farm </a:t>
+            </a:r>
+            <a:r>
+              <a:rPr lang="en-US" sz="2000" dirty="0" smtClean="0">
+                <a:latin typeface="Arial"/>
+                <a:cs typeface="Arial"/>
+              </a:rPr>
+              <a:t>placement. </a:t>
+            </a:r>
+            <a:r>
+              <a:rPr lang="en-US" sz="2000" b="1" dirty="0" smtClean="0">
+                <a:latin typeface="Arial"/>
+                <a:cs typeface="Arial"/>
+              </a:rPr>
+              <a:t>Bottom </a:t>
+            </a:r>
+            <a:r>
+              <a:rPr lang="en-US" sz="2000" b="1" dirty="0" smtClean="0">
+                <a:latin typeface="Arial"/>
+                <a:cs typeface="Arial"/>
+              </a:rPr>
+              <a:t>Right:</a:t>
+            </a:r>
+            <a:r>
+              <a:rPr lang="en-US" sz="2000" dirty="0" smtClean="0">
+                <a:latin typeface="Arial"/>
+                <a:cs typeface="Arial"/>
+              </a:rPr>
+              <a:t> various </a:t>
+            </a:r>
+            <a:r>
+              <a:rPr lang="en-US" sz="2000" dirty="0" err="1" smtClean="0">
+                <a:latin typeface="Arial"/>
+                <a:cs typeface="Arial"/>
+              </a:rPr>
+              <a:t>Matpower</a:t>
+            </a:r>
+            <a:r>
+              <a:rPr lang="en-US" sz="2000" dirty="0" smtClean="0">
+                <a:latin typeface="Arial"/>
+                <a:cs typeface="Arial"/>
+              </a:rPr>
+              <a:t> </a:t>
+            </a:r>
+            <a:r>
+              <a:rPr lang="en-US" sz="2000" dirty="0">
+                <a:latin typeface="Arial"/>
+                <a:cs typeface="Arial"/>
+              </a:rPr>
+              <a:t>networks. </a:t>
+            </a:r>
+            <a:r>
+              <a:rPr lang="en-US" sz="2000" dirty="0" smtClean="0">
+                <a:latin typeface="Arial"/>
+                <a:cs typeface="Arial"/>
+              </a:rPr>
+              <a:t>In each case the </a:t>
+            </a:r>
+            <a:r>
+              <a:rPr lang="en-US" sz="2000" dirty="0">
+                <a:latin typeface="Arial"/>
+                <a:cs typeface="Arial"/>
+              </a:rPr>
+              <a:t>number of wind farms was fixed to the number of generators, with overall penetration fixed to 70%. Wind sites were chosen randomly. “Normalized computation time” is the mean of ten QCQP solutions.</a:t>
+            </a:r>
           </a:p>
           <a:p>
             <a:pPr algn="ctr"/>
@@ -7428,8 +7769,8 @@
             </p:nvSpPr>
             <p:spPr>
               <a:xfrm>
-                <a:off x="14401798" y="10676419"/>
-                <a:ext cx="5943601" cy="5793216"/>
+                <a:off x="14401799" y="10676419"/>
+                <a:ext cx="4632961" cy="5793216"/>
               </a:xfrm>
               <a:prstGeom prst="rect">
                 <a:avLst/>
@@ -7459,17 +7800,7 @@
                     <a:latin typeface="Arial" panose="020B0604020202020204" pitchFamily="34" charset="0"/>
                     <a:cs typeface="Arial" panose="020B0604020202020204" pitchFamily="34" charset="0"/>
                   </a:rPr>
-                  <a:t>4. </a:t>
-                </a:r>
-                <a:r>
-                  <a:rPr lang="en-US" altLang="en-US" sz="2800" b="1" dirty="0">
-                    <a:solidFill>
-                      <a:srgbClr val="000000"/>
-                    </a:solidFill>
-                    <a:latin typeface="Arial" panose="020B0604020202020204" pitchFamily="34" charset="0"/>
-                    <a:cs typeface="Arial" panose="020B0604020202020204" pitchFamily="34" charset="0"/>
-                  </a:rPr>
-                  <a:t>Eliminate </a:t>
+                  <a:t>4. Eliminate </a:t>
                 </a:r>
                 <a14:m>
                   <m:oMath xmlns:m="http://schemas.openxmlformats.org/officeDocument/2006/math">
@@ -7530,17 +7861,7 @@
                     <a:latin typeface="Arial" panose="020B0604020202020204" pitchFamily="34" charset="0"/>
                     <a:cs typeface="Arial" panose="020B0604020202020204" pitchFamily="34" charset="0"/>
                   </a:rPr>
-                  <a:t>Use partial </a:t>
-                </a:r>
-                <a:r>
-                  <a:rPr lang="en-US" altLang="en-US" sz="2800" dirty="0">
-                    <a:solidFill>
-                      <a:srgbClr val="000000"/>
-                    </a:solidFill>
-                    <a:latin typeface="Arial" panose="020B0604020202020204" pitchFamily="34" charset="0"/>
-                    <a:cs typeface="Arial" panose="020B0604020202020204" pitchFamily="34" charset="0"/>
-                  </a:rPr>
-                  <a:t>KKT conditions</a:t>
+                  <a:t>Use partial KKT conditions</a:t>
                 </a:r>
                 <a:r>
                   <a:rPr lang="en-US" altLang="en-US" sz="2800" dirty="0" smtClean="0">
@@ -8305,8 +8626,8 @@
             </p:nvSpPr>
             <p:spPr>
               <a:xfrm>
-                <a:off x="14401798" y="10676419"/>
-                <a:ext cx="5943601" cy="5793216"/>
+                <a:off x="14401799" y="10676419"/>
+                <a:ext cx="4632961" cy="5793216"/>
               </a:xfrm>
               <a:prstGeom prst="rect">
                 <a:avLst/>
@@ -8314,7 +8635,7 @@
               <a:blipFill rotWithShape="0">
                 <a:blip r:embed="rId11"/>
                 <a:stretch>
-                  <a:fillRect l="-2051" t="-1052" r="-2154"/>
+                  <a:fillRect l="-2628" t="-1052" r="-2628" b="-9569"/>
                 </a:stretch>
               </a:blipFill>
             </p:spPr>
@@ -8355,8 +8676,38 @@
         </p:blipFill>
         <p:spPr>
           <a:xfrm>
-            <a:off x="23832063" y="32906203"/>
-            <a:ext cx="2685536" cy="2685536"/>
+            <a:off x="23902769" y="32652203"/>
+            <a:ext cx="2614829" cy="2614829"/>
+          </a:xfrm>
+          <a:prstGeom prst="rect">
+            <a:avLst/>
+          </a:prstGeom>
+        </p:spPr>
+      </p:pic>
+      <p:pic>
+        <p:nvPicPr>
+          <p:cNvPr id="3" name="Picture 2"/>
+          <p:cNvPicPr>
+            <a:picLocks noChangeAspect="1"/>
+          </p:cNvPicPr>
+          <p:nvPr/>
+        </p:nvPicPr>
+        <p:blipFill>
+          <a:blip r:embed="rId13" cstate="print">
+            <a:extLst>
+              <a:ext uri="{28A0092B-C50C-407E-A947-70E740481C1C}">
+                <a14:useLocalDpi xmlns:a14="http://schemas.microsoft.com/office/drawing/2010/main" val="0"/>
+              </a:ext>
+            </a:extLst>
+          </a:blip>
+          <a:stretch>
+            <a:fillRect/>
+          </a:stretch>
+        </p:blipFill>
+        <p:spPr>
+          <a:xfrm>
+            <a:off x="20790579" y="24446452"/>
+            <a:ext cx="5841321" cy="5019689"/>
           </a:xfrm>
           <a:prstGeom prst="rect">
             <a:avLst/>

</xml_diff>